<commit_message>
Presentation Cab Company Investment
</commit_message>
<xml_diff>
--- a/PresentationCab.pptx
+++ b/PresentationCab.pptx
@@ -131,14 +131,6 @@
     </p:ext>
   </p:extLst>
 </p:presentation>
-</file>
-
-<file path=ppt/revisionInfo.xml><?xml version="1.0" encoding="utf-8"?>
-<p1510:revInfo xmlns:a="http://schemas.openxmlformats.org/drawingml/2006/main" xmlns:r="http://schemas.openxmlformats.org/officeDocument/2006/relationships" xmlns:p1510="http://schemas.microsoft.com/office/powerpoint/2015/10/main">
-  <p1510:revLst>
-    <p1510:client id="{36E0061F-BFDE-7175-2EDA-F472504290F4}" v="789" dt="2020-12-24T05:43:13.363"/>
-  </p1510:revLst>
-</p1510:revInfo>
 </file>
 
 <file path=ppt/slideLayouts/slideLayout1.xml><?xml version="1.0" encoding="utf-8"?>
@@ -3039,7 +3031,7 @@
         <p:spPr>
           <a:xfrm>
             <a:off x="870857" y="2380343"/>
-            <a:ext cx="8873711" cy="2769989"/>
+            <a:ext cx="8873711" cy="3200876"/>
           </a:xfrm>
           <a:prstGeom prst="rect">
             <a:avLst/>
@@ -3076,6 +3068,12 @@
             <a:r>
               <a:rPr lang="en-US" sz="2800" b="1" dirty="0"/>
               <a:t>15/3/2021</a:t>
+            </a:r>
+          </a:p>
+          <a:p>
+            <a:r>
+              <a:rPr lang="en-US" sz="2800" b="1" dirty="0"/>
+              <a:t>Erik Perez</a:t>
             </a:r>
           </a:p>
         </p:txBody>

</xml_diff>

<commit_message>
Presentation Cab Company Investment 4
</commit_message>
<xml_diff>
--- a/PresentationCab.pptx
+++ b/PresentationCab.pptx
@@ -3031,7 +3031,7 @@
         <p:spPr>
           <a:xfrm>
             <a:off x="870857" y="2380343"/>
-            <a:ext cx="8873711" cy="3200876"/>
+            <a:ext cx="8873711" cy="4062651"/>
           </a:xfrm>
           <a:prstGeom prst="rect">
             <a:avLst/>
@@ -3067,15 +3067,26 @@
           <a:p>
             <a:r>
               <a:rPr lang="en-US" sz="2800" b="1" dirty="0"/>
-              <a:t>15/3/2021</a:t>
-            </a:r>
-          </a:p>
-          <a:p>
-            <a:r>
-              <a:rPr lang="en-US" sz="2800" b="1"/>
-              <a:t>Erik Perez</a:t>
-            </a:r>
-            <a:endParaRPr lang="en-US" sz="2800" b="1" dirty="0"/>
+              <a:t>Name: Erik Perez</a:t>
+            </a:r>
+          </a:p>
+          <a:p>
+            <a:r>
+              <a:rPr lang="en-US" sz="2800" b="1" dirty="0"/>
+              <a:t>Location: Peru</a:t>
+            </a:r>
+          </a:p>
+          <a:p>
+            <a:r>
+              <a:rPr lang="en-US" sz="2800" b="1" dirty="0"/>
+              <a:t>Team: Data Science</a:t>
+            </a:r>
+          </a:p>
+          <a:p>
+            <a:r>
+              <a:rPr lang="en-US" sz="2800" b="1" dirty="0"/>
+              <a:t>Date: 15/3/2021</a:t>
+            </a:r>
           </a:p>
         </p:txBody>
       </p:sp>

</xml_diff>